<commit_message>
Presentacion actualizada con logo de CodeJobs y Licencia CC Agregada Licencia BSD para el contenido general
</commit_message>
<xml_diff>
--- a/introduction/Backbone.pptx
+++ b/introduction/Backbone.pptx
@@ -825,6 +825,189 @@
 </p:notesMaster>
 </file>
 
+<file path=ppt/notesSlides/notesSlide1.xml><?xml version="1.0" encoding="utf-8"?>
+<p:notes xmlns:a="http://schemas.openxmlformats.org/drawingml/2006/main" xmlns:r="http://schemas.openxmlformats.org/officeDocument/2006/relationships" xmlns:p="http://schemas.openxmlformats.org/presentationml/2006/main">
+  <p:cSld>
+    <p:spTree>
+      <p:nvGrpSpPr>
+        <p:cNvPr id="1" name=""/>
+        <p:cNvGrpSpPr/>
+        <p:nvPr/>
+      </p:nvGrpSpPr>
+      <p:grpSpPr>
+        <a:xfrm>
+          <a:off x="0" y="0"/>
+          <a:ext cx="0" cy="0"/>
+          <a:chOff x="0" y="0"/>
+          <a:chExt cx="0" cy="0"/>
+        </a:xfrm>
+      </p:grpSpPr>
+      <p:sp>
+        <p:nvSpPr>
+          <p:cNvPr id="2" name="Slide Image Placeholder 1"/>
+          <p:cNvSpPr>
+            <a:spLocks noGrp="1" noRot="1" noChangeAspect="1"/>
+          </p:cNvSpPr>
+          <p:nvPr>
+            <p:ph type="sldImg"/>
+          </p:nvPr>
+        </p:nvSpPr>
+        <p:spPr/>
+      </p:sp>
+      <p:sp>
+        <p:nvSpPr>
+          <p:cNvPr id="3" name="Notes Placeholder 2"/>
+          <p:cNvSpPr>
+            <a:spLocks noGrp="1"/>
+          </p:cNvSpPr>
+          <p:nvPr>
+            <p:ph type="body" idx="1"/>
+          </p:nvPr>
+        </p:nvSpPr>
+        <p:spPr/>
+        <p:txBody>
+          <a:bodyPr/>
+          <a:lstStyle/>
+          <a:p>
+            <a:endParaRPr lang="en-US"/>
+          </a:p>
+        </p:txBody>
+      </p:sp>
+    </p:spTree>
+    <p:extLst>
+      <p:ext uri="{BB962C8B-B14F-4D97-AF65-F5344CB8AC3E}">
+        <p14:creationId xmlns:p14="http://schemas.microsoft.com/office/powerpoint/2010/main" val="3320380971"/>
+      </p:ext>
+    </p:extLst>
+  </p:cSld>
+  <p:clrMapOvr>
+    <a:masterClrMapping/>
+  </p:clrMapOvr>
+</p:notes>
+</file>
+
+<file path=ppt/notesSlides/notesSlide2.xml><?xml version="1.0" encoding="utf-8"?>
+<p:notes xmlns:a="http://schemas.openxmlformats.org/drawingml/2006/main" xmlns:r="http://schemas.openxmlformats.org/officeDocument/2006/relationships" xmlns:p="http://schemas.openxmlformats.org/presentationml/2006/main">
+  <p:cSld>
+    <p:spTree>
+      <p:nvGrpSpPr>
+        <p:cNvPr id="1" name=""/>
+        <p:cNvGrpSpPr/>
+        <p:nvPr/>
+      </p:nvGrpSpPr>
+      <p:grpSpPr>
+        <a:xfrm>
+          <a:off x="0" y="0"/>
+          <a:ext cx="0" cy="0"/>
+          <a:chOff x="0" y="0"/>
+          <a:chExt cx="0" cy="0"/>
+        </a:xfrm>
+      </p:grpSpPr>
+      <p:sp>
+        <p:nvSpPr>
+          <p:cNvPr id="2" name="Slide Image Placeholder 1"/>
+          <p:cNvSpPr>
+            <a:spLocks noGrp="1" noRot="1" noChangeAspect="1"/>
+          </p:cNvSpPr>
+          <p:nvPr>
+            <p:ph type="sldImg"/>
+          </p:nvPr>
+        </p:nvSpPr>
+        <p:spPr/>
+      </p:sp>
+      <p:sp>
+        <p:nvSpPr>
+          <p:cNvPr id="3" name="Notes Placeholder 2"/>
+          <p:cNvSpPr>
+            <a:spLocks noGrp="1"/>
+          </p:cNvSpPr>
+          <p:nvPr>
+            <p:ph type="body" idx="1"/>
+          </p:nvPr>
+        </p:nvSpPr>
+        <p:spPr/>
+        <p:txBody>
+          <a:bodyPr/>
+          <a:lstStyle/>
+          <a:p>
+            <a:endParaRPr lang="en-US" dirty="0"/>
+          </a:p>
+        </p:txBody>
+      </p:sp>
+    </p:spTree>
+    <p:extLst>
+      <p:ext uri="{BB962C8B-B14F-4D97-AF65-F5344CB8AC3E}">
+        <p14:creationId xmlns:p14="http://schemas.microsoft.com/office/powerpoint/2010/main" val="3492327131"/>
+      </p:ext>
+    </p:extLst>
+  </p:cSld>
+  <p:clrMapOvr>
+    <a:masterClrMapping/>
+  </p:clrMapOvr>
+</p:notes>
+</file>
+
+<file path=ppt/notesSlides/notesSlide3.xml><?xml version="1.0" encoding="utf-8"?>
+<p:notes xmlns:a="http://schemas.openxmlformats.org/drawingml/2006/main" xmlns:r="http://schemas.openxmlformats.org/officeDocument/2006/relationships" xmlns:p="http://schemas.openxmlformats.org/presentationml/2006/main">
+  <p:cSld>
+    <p:spTree>
+      <p:nvGrpSpPr>
+        <p:cNvPr id="1" name=""/>
+        <p:cNvGrpSpPr/>
+        <p:nvPr/>
+      </p:nvGrpSpPr>
+      <p:grpSpPr>
+        <a:xfrm>
+          <a:off x="0" y="0"/>
+          <a:ext cx="0" cy="0"/>
+          <a:chOff x="0" y="0"/>
+          <a:chExt cx="0" cy="0"/>
+        </a:xfrm>
+      </p:grpSpPr>
+      <p:sp>
+        <p:nvSpPr>
+          <p:cNvPr id="2" name="Slide Image Placeholder 1"/>
+          <p:cNvSpPr>
+            <a:spLocks noGrp="1" noRot="1" noChangeAspect="1"/>
+          </p:cNvSpPr>
+          <p:nvPr>
+            <p:ph type="sldImg"/>
+          </p:nvPr>
+        </p:nvSpPr>
+        <p:spPr/>
+      </p:sp>
+      <p:sp>
+        <p:nvSpPr>
+          <p:cNvPr id="3" name="Notes Placeholder 2"/>
+          <p:cNvSpPr>
+            <a:spLocks noGrp="1"/>
+          </p:cNvSpPr>
+          <p:nvPr>
+            <p:ph type="body" idx="1"/>
+          </p:nvPr>
+        </p:nvSpPr>
+        <p:spPr/>
+        <p:txBody>
+          <a:bodyPr/>
+          <a:lstStyle/>
+          <a:p>
+            <a:endParaRPr lang="en-US" dirty="0"/>
+          </a:p>
+        </p:txBody>
+      </p:sp>
+    </p:spTree>
+    <p:extLst>
+      <p:ext uri="{BB962C8B-B14F-4D97-AF65-F5344CB8AC3E}">
+        <p14:creationId xmlns:p14="http://schemas.microsoft.com/office/powerpoint/2010/main" val="1983053984"/>
+      </p:ext>
+    </p:extLst>
+  </p:cSld>
+  <p:clrMapOvr>
+    <a:masterClrMapping/>
+  </p:clrMapOvr>
+</p:notes>
+</file>
+
 <file path=ppt/slideLayouts/slideLayout1.xml><?xml version="1.0" encoding="utf-8"?>
 <p:sldLayout xmlns:a="http://schemas.openxmlformats.org/drawingml/2006/main" xmlns:r="http://schemas.openxmlformats.org/officeDocument/2006/relationships" xmlns:p="http://schemas.openxmlformats.org/presentationml/2006/main" type="title" preserve="1">
   <p:cSld name="Title Slide">
@@ -1006,7 +1189,7 @@
           <a:p>
             <a:fld id="{9A0CE46A-0A30-488F-AC00-5EE128A68B2E}" type="datetime1">
               <a:rPr lang="en-US" smtClean="0"/>
-              <a:t>2/4/2012</a:t>
+              <a:t>2/7/2012</a:t>
             </a:fld>
             <a:endParaRPr lang="en-US"/>
           </a:p>
@@ -1181,7 +1364,7 @@
           <a:p>
             <a:fld id="{2F8ACDA5-B3C1-42DA-BA08-BA16237BEED8}" type="datetime1">
               <a:rPr lang="en-US" smtClean="0"/>
-              <a:t>2/4/2012</a:t>
+              <a:t>2/7/2012</a:t>
             </a:fld>
             <a:endParaRPr lang="en-US"/>
           </a:p>
@@ -1365,7 +1548,7 @@
           <a:p>
             <a:fld id="{37D52F0A-6B09-41F2-83F1-8BF0BFDF19A9}" type="datetime1">
               <a:rPr lang="en-US" smtClean="0"/>
-              <a:t>2/4/2012</a:t>
+              <a:t>2/7/2012</a:t>
             </a:fld>
             <a:endParaRPr lang="en-US"/>
           </a:p>
@@ -2533,7 +2716,7 @@
           <a:p>
             <a:fld id="{AC56CE71-F26E-49C6-A2E1-E1FD467E438D}" type="datetime1">
               <a:rPr lang="en-US" smtClean="0"/>
-              <a:t>2/4/2012</a:t>
+              <a:t>2/7/2012</a:t>
             </a:fld>
             <a:endParaRPr lang="en-US"/>
           </a:p>
@@ -2685,7 +2868,7 @@
                   <a:spcPct val="90000"/>
                 </a:lnSpc>
               </a:pPr>
-              <a:t>2/4/2012</a:t>
+              <a:t>2/7/2012</a:t>
             </a:fld>
             <a:endParaRPr lang="en-US" dirty="0"/>
           </a:p>
@@ -2889,7 +3072,7 @@
           <a:p>
             <a:fld id="{F7BF53A0-F761-4D7F-93DB-E37014D38ACE}" type="datetime1">
               <a:rPr lang="en-US" smtClean="0"/>
-              <a:t>2/4/2012</a:t>
+              <a:t>2/7/2012</a:t>
             </a:fld>
             <a:endParaRPr lang="en-US"/>
           </a:p>
@@ -3182,7 +3365,7 @@
           <a:p>
             <a:fld id="{0C5ACEF2-4BAE-43E9-A503-4D6FBD712D51}" type="datetime1">
               <a:rPr lang="en-US" smtClean="0"/>
-              <a:t>2/4/2012</a:t>
+              <a:t>2/7/2012</a:t>
             </a:fld>
             <a:endParaRPr lang="en-US"/>
           </a:p>
@@ -3333,7 +3516,7 @@
                   <a:spcPct val="90000"/>
                 </a:lnSpc>
               </a:pPr>
-              <a:t>2/4/2012</a:t>
+              <a:t>2/7/2012</a:t>
             </a:fld>
             <a:endParaRPr lang="en-US" dirty="0"/>
           </a:p>
@@ -3713,7 +3896,7 @@
           <a:p>
             <a:fld id="{E70056D2-0D16-4802-BC54-0A52FEDE0D78}" type="datetime1">
               <a:rPr lang="en-US" smtClean="0"/>
-              <a:t>2/4/2012</a:t>
+              <a:t>2/7/2012</a:t>
             </a:fld>
             <a:endParaRPr lang="en-US"/>
           </a:p>
@@ -3864,7 +4047,7 @@
                   <a:spcPct val="90000"/>
                 </a:lnSpc>
               </a:pPr>
-              <a:t>2/4/2012</a:t>
+              <a:t>2/7/2012</a:t>
             </a:fld>
             <a:endParaRPr lang="en-US" dirty="0"/>
           </a:p>
@@ -3940,7 +4123,7 @@
           <a:p>
             <a:fld id="{193C2659-DA17-43E7-8C2A-99B0D0723DFC}" type="datetime1">
               <a:rPr lang="en-US" smtClean="0"/>
-              <a:t>2/4/2012</a:t>
+              <a:t>2/7/2012</a:t>
             </a:fld>
             <a:endParaRPr lang="en-US"/>
           </a:p>
@@ -4091,7 +4274,7 @@
                   <a:spcPct val="90000"/>
                 </a:lnSpc>
               </a:pPr>
-              <a:t>2/4/2012</a:t>
+              <a:t>2/7/2012</a:t>
             </a:fld>
             <a:endParaRPr lang="en-US" dirty="0"/>
           </a:p>
@@ -4144,7 +4327,7 @@
           <a:p>
             <a:fld id="{B902C385-9ED9-487F-9C48-669F5DCE2174}" type="datetime1">
               <a:rPr lang="en-US" smtClean="0"/>
-              <a:t>2/4/2012</a:t>
+              <a:t>2/7/2012</a:t>
             </a:fld>
             <a:endParaRPr lang="en-US"/>
           </a:p>
@@ -4425,7 +4608,7 @@
           <a:p>
             <a:fld id="{66323D8D-3AE1-4028-9A00-1BF0F82FC5AC}" type="datetime1">
               <a:rPr lang="en-US" smtClean="0"/>
-              <a:t>2/4/2012</a:t>
+              <a:t>2/7/2012</a:t>
             </a:fld>
             <a:endParaRPr lang="en-US"/>
           </a:p>
@@ -4682,7 +4865,7 @@
           <a:p>
             <a:fld id="{463A221F-56B2-4DE9-BC6F-277B5467600C}" type="datetime1">
               <a:rPr lang="en-US" smtClean="0"/>
-              <a:t>2/4/2012</a:t>
+              <a:t>2/7/2012</a:t>
             </a:fld>
             <a:endParaRPr lang="en-US"/>
           </a:p>
@@ -4899,7 +5082,7 @@
           <a:p>
             <a:fld id="{B8673F3F-E6A1-4388-9D42-EB32A1CDC3BF}" type="datetime1">
               <a:rPr lang="en-US" smtClean="0"/>
-              <a:t>2/4/2012</a:t>
+              <a:t>2/7/2012</a:t>
             </a:fld>
             <a:endParaRPr lang="en-US"/>
           </a:p>
@@ -5286,6 +5469,36 @@
           <a:chExt cx="0" cy="0"/>
         </a:xfrm>
       </p:grpSpPr>
+      <p:pic>
+        <p:nvPicPr>
+          <p:cNvPr id="5" name="Picture 4"/>
+          <p:cNvPicPr>
+            <a:picLocks noChangeAspect="1"/>
+          </p:cNvPicPr>
+          <p:nvPr/>
+        </p:nvPicPr>
+        <p:blipFill>
+          <a:blip r:embed="rId3">
+            <a:extLst>
+              <a:ext uri="{28A0092B-C50C-407E-A947-70E740481C1C}">
+                <a14:useLocalDpi xmlns:a14="http://schemas.microsoft.com/office/drawing/2010/main" val="0"/>
+              </a:ext>
+            </a:extLst>
+          </a:blip>
+          <a:stretch>
+            <a:fillRect/>
+          </a:stretch>
+        </p:blipFill>
+        <p:spPr>
+          <a:xfrm>
+            <a:off x="3169087" y="61850"/>
+            <a:ext cx="2758373" cy="2758373"/>
+          </a:xfrm>
+          <a:prstGeom prst="rect">
+            <a:avLst/>
+          </a:prstGeom>
+        </p:spPr>
+      </p:pic>
       <p:sp>
         <p:nvSpPr>
           <p:cNvPr id="2" name="Title 1"/>
@@ -5338,7 +5551,7 @@
               <a:rPr lang="en-US" sz="2400" dirty="0">
                 <a:latin typeface="Consolas" pitchFamily="49" charset="0"/>
                 <a:cs typeface="Consolas" pitchFamily="49" charset="0"/>
-                <a:hlinkClick r:id="rId2"/>
+                <a:hlinkClick r:id="rId4"/>
               </a:rPr>
               <a:t>http://documentcloud.github.com/backbone</a:t>
             </a:r>
@@ -5346,7 +5559,7 @@
               <a:rPr lang="en-US" sz="2400" dirty="0" smtClean="0">
                 <a:latin typeface="Consolas" pitchFamily="49" charset="0"/>
                 <a:cs typeface="Consolas" pitchFamily="49" charset="0"/>
-                <a:hlinkClick r:id="rId2"/>
+                <a:hlinkClick r:id="rId4"/>
               </a:rPr>
               <a:t>/</a:t>
             </a:r>
@@ -5380,6 +5593,21 @@
 <file path=ppt/slides/slide10.xml><?xml version="1.0" encoding="utf-8"?>
 <p:sld xmlns:a="http://schemas.openxmlformats.org/drawingml/2006/main" xmlns:r="http://schemas.openxmlformats.org/officeDocument/2006/relationships" xmlns:p="http://schemas.openxmlformats.org/presentationml/2006/main">
   <p:cSld>
+    <p:bg>
+      <p:bgPr>
+        <a:blipFill dpi="0" rotWithShape="1">
+          <a:blip r:embed="rId2">
+            <a:alphaModFix amt="25000"/>
+            <a:lum/>
+          </a:blip>
+          <a:srcRect/>
+          <a:stretch>
+            <a:fillRect l="75000" t="75000" r="5000"/>
+          </a:stretch>
+        </a:blipFill>
+        <a:effectLst/>
+      </p:bgPr>
+    </p:bg>
     <p:spTree>
       <p:nvGrpSpPr>
         <p:cNvPr id="1" name=""/>
@@ -5484,19 +5712,7 @@
                 <a:latin typeface="Consolas" pitchFamily="49" charset="0"/>
                 <a:cs typeface="Consolas" pitchFamily="49" charset="0"/>
               </a:rPr>
-              <a:t> </a:t>
-            </a:r>
-            <a:r>
-              <a:rPr lang="en-US" sz="2400" dirty="0" smtClean="0">
-                <a:solidFill>
-                  <a:schemeClr val="bg1">
-                    <a:lumMod val="65000"/>
-                  </a:schemeClr>
-                </a:solidFill>
-                <a:latin typeface="Consolas" pitchFamily="49" charset="0"/>
-                <a:cs typeface="Consolas" pitchFamily="49" charset="0"/>
-              </a:rPr>
-              <a:t>me </a:t>
+              <a:t> me </a:t>
             </a:r>
             <a:r>
               <a:rPr lang="en-US" sz="2400" dirty="0" err="1" smtClean="0">
@@ -5840,6 +6056,21 @@
 <file path=ppt/slides/slide11.xml><?xml version="1.0" encoding="utf-8"?>
 <p:sld xmlns:a="http://schemas.openxmlformats.org/drawingml/2006/main" xmlns:r="http://schemas.openxmlformats.org/officeDocument/2006/relationships" xmlns:p="http://schemas.openxmlformats.org/presentationml/2006/main">
   <p:cSld>
+    <p:bg>
+      <p:bgPr>
+        <a:blipFill dpi="0" rotWithShape="1">
+          <a:blip r:embed="rId2">
+            <a:alphaModFix amt="25000"/>
+            <a:lum/>
+          </a:blip>
+          <a:srcRect/>
+          <a:stretch>
+            <a:fillRect l="75000" t="75000" r="5000"/>
+          </a:stretch>
+        </a:blipFill>
+        <a:effectLst/>
+      </p:bgPr>
+    </p:bg>
     <p:spTree>
       <p:nvGrpSpPr>
         <p:cNvPr id="1" name=""/>
@@ -5944,19 +6175,7 @@
                 <a:latin typeface="Consolas" pitchFamily="49" charset="0"/>
                 <a:cs typeface="Consolas" pitchFamily="49" charset="0"/>
               </a:rPr>
-              <a:t> </a:t>
-            </a:r>
-            <a:r>
-              <a:rPr lang="en-US" sz="2400" dirty="0" smtClean="0">
-                <a:solidFill>
-                  <a:schemeClr val="bg1">
-                    <a:lumMod val="65000"/>
-                  </a:schemeClr>
-                </a:solidFill>
-                <a:latin typeface="Consolas" pitchFamily="49" charset="0"/>
-                <a:cs typeface="Consolas" pitchFamily="49" charset="0"/>
-              </a:rPr>
-              <a:t>me </a:t>
+              <a:t> me </a:t>
             </a:r>
             <a:r>
               <a:rPr lang="en-US" sz="2400" dirty="0" err="1" smtClean="0">
@@ -6210,6 +6429,21 @@
 <file path=ppt/slides/slide12.xml><?xml version="1.0" encoding="utf-8"?>
 <p:sld xmlns:a="http://schemas.openxmlformats.org/drawingml/2006/main" xmlns:r="http://schemas.openxmlformats.org/officeDocument/2006/relationships" xmlns:p="http://schemas.openxmlformats.org/presentationml/2006/main">
   <p:cSld>
+    <p:bg>
+      <p:bgPr>
+        <a:blipFill dpi="0" rotWithShape="1">
+          <a:blip r:embed="rId2">
+            <a:alphaModFix amt="25000"/>
+            <a:lum/>
+          </a:blip>
+          <a:srcRect/>
+          <a:stretch>
+            <a:fillRect l="75000" t="75000" r="5000"/>
+          </a:stretch>
+        </a:blipFill>
+        <a:effectLst/>
+      </p:bgPr>
+    </p:bg>
     <p:spTree>
       <p:nvGrpSpPr>
         <p:cNvPr id="1" name=""/>
@@ -6314,19 +6548,7 @@
                 <a:latin typeface="Consolas" pitchFamily="49" charset="0"/>
                 <a:cs typeface="Consolas" pitchFamily="49" charset="0"/>
               </a:rPr>
-              <a:t> </a:t>
-            </a:r>
-            <a:r>
-              <a:rPr lang="en-US" sz="2400" dirty="0" smtClean="0">
-                <a:solidFill>
-                  <a:schemeClr val="bg1">
-                    <a:lumMod val="65000"/>
-                  </a:schemeClr>
-                </a:solidFill>
-                <a:latin typeface="Consolas" pitchFamily="49" charset="0"/>
-                <a:cs typeface="Consolas" pitchFamily="49" charset="0"/>
-              </a:rPr>
-              <a:t>me </a:t>
+              <a:t> me </a:t>
             </a:r>
             <a:r>
               <a:rPr lang="en-US" sz="2400" dirty="0" err="1" smtClean="0">
@@ -6615,6 +6837,21 @@
 <file path=ppt/slides/slide13.xml><?xml version="1.0" encoding="utf-8"?>
 <p:sld xmlns:a="http://schemas.openxmlformats.org/drawingml/2006/main" xmlns:r="http://schemas.openxmlformats.org/officeDocument/2006/relationships" xmlns:p="http://schemas.openxmlformats.org/presentationml/2006/main">
   <p:cSld>
+    <p:bg>
+      <p:bgPr>
+        <a:blipFill dpi="0" rotWithShape="1">
+          <a:blip r:embed="rId2">
+            <a:alphaModFix amt="25000"/>
+            <a:lum/>
+          </a:blip>
+          <a:srcRect/>
+          <a:stretch>
+            <a:fillRect l="75000" t="75000" r="5000"/>
+          </a:stretch>
+        </a:blipFill>
+        <a:effectLst/>
+      </p:bgPr>
+    </p:bg>
     <p:spTree>
       <p:nvGrpSpPr>
         <p:cNvPr id="1" name=""/>
@@ -6719,19 +6956,7 @@
                 <a:latin typeface="Consolas" pitchFamily="49" charset="0"/>
                 <a:cs typeface="Consolas" pitchFamily="49" charset="0"/>
               </a:rPr>
-              <a:t> </a:t>
-            </a:r>
-            <a:r>
-              <a:rPr lang="en-US" sz="2400" dirty="0" smtClean="0">
-                <a:solidFill>
-                  <a:schemeClr val="bg1">
-                    <a:lumMod val="65000"/>
-                  </a:schemeClr>
-                </a:solidFill>
-                <a:latin typeface="Consolas" pitchFamily="49" charset="0"/>
-                <a:cs typeface="Consolas" pitchFamily="49" charset="0"/>
-              </a:rPr>
-              <a:t>me </a:t>
+              <a:t> me </a:t>
             </a:r>
             <a:r>
               <a:rPr lang="en-US" sz="2400" dirty="0" err="1" smtClean="0">
@@ -6982,6 +7207,21 @@
 <file path=ppt/slides/slide14.xml><?xml version="1.0" encoding="utf-8"?>
 <p:sld xmlns:a="http://schemas.openxmlformats.org/drawingml/2006/main" xmlns:r="http://schemas.openxmlformats.org/officeDocument/2006/relationships" xmlns:p="http://schemas.openxmlformats.org/presentationml/2006/main">
   <p:cSld>
+    <p:bg>
+      <p:bgPr>
+        <a:blipFill dpi="0" rotWithShape="1">
+          <a:blip r:embed="rId3">
+            <a:alphaModFix amt="25000"/>
+            <a:lum/>
+          </a:blip>
+          <a:srcRect/>
+          <a:stretch>
+            <a:fillRect l="75000" t="75000" r="5000"/>
+          </a:stretch>
+        </a:blipFill>
+        <a:effectLst/>
+      </p:bgPr>
+    </p:bg>
     <p:spTree>
       <p:nvGrpSpPr>
         <p:cNvPr id="1" name=""/>
@@ -7046,10 +7286,6 @@
               </a:rPr>
               <a:t>();</a:t>
             </a:r>
-            <a:endParaRPr lang="en-US" sz="4000" dirty="0" smtClean="0">
-              <a:latin typeface="Consolas" pitchFamily="49" charset="0"/>
-              <a:cs typeface="Consolas" pitchFamily="49" charset="0"/>
-            </a:endParaRPr>
           </a:p>
           <a:p>
             <a:r>
@@ -7347,7 +7583,7 @@
           <a:p>
             <a:r>
               <a:rPr lang="en-US" dirty="0" smtClean="0">
-                <a:hlinkClick r:id="rId2"/>
+                <a:hlinkClick r:id="rId4"/>
               </a:rPr>
               <a:t>erickrdch.com</a:t>
             </a:r>
@@ -7355,7 +7591,6 @@
               <a:rPr lang="en-US" dirty="0" smtClean="0"/>
               <a:t> </a:t>
             </a:r>
-            <a:endParaRPr lang="en-US" dirty="0" smtClean="0"/>
           </a:p>
           <a:p>
             <a:r>
@@ -7386,7 +7621,7 @@
           <p:nvPr/>
         </p:nvPicPr>
         <p:blipFill>
-          <a:blip r:embed="rId3" cstate="print">
+          <a:blip r:embed="rId5" cstate="print">
             <a:extLst>
               <a:ext uri="{28A0092B-C50C-407E-A947-70E740481C1C}">
                 <a14:useLocalDpi xmlns:a14="http://schemas.microsoft.com/office/drawing/2010/main" val="0"/>
@@ -7425,6 +7660,108 @@
           </a:extLst>
         </p:spPr>
       </p:pic>
+      <p:sp>
+        <p:nvSpPr>
+          <p:cNvPr id="3" name="Rectangle 2"/>
+          <p:cNvSpPr/>
+          <p:nvPr/>
+        </p:nvSpPr>
+        <p:spPr>
+          <a:xfrm>
+            <a:off x="0" y="6611779"/>
+            <a:ext cx="6750424" cy="246221"/>
+          </a:xfrm>
+          <a:prstGeom prst="rect">
+            <a:avLst/>
+          </a:prstGeom>
+        </p:spPr>
+        <p:txBody>
+          <a:bodyPr wrap="square">
+            <a:spAutoFit/>
+          </a:bodyPr>
+          <a:lstStyle/>
+          <a:p>
+            <a:r>
+              <a:rPr lang="en-US" sz="1000" dirty="0">
+                <a:solidFill>
+                  <a:srgbClr val="000000"/>
+                </a:solidFill>
+                <a:latin typeface="Helvetica Neue"/>
+              </a:rPr>
+              <a:t>This work by </a:t>
+            </a:r>
+            <a:r>
+              <a:rPr lang="en-US" sz="1000" dirty="0">
+                <a:solidFill>
+                  <a:srgbClr val="4374B7"/>
+                </a:solidFill>
+                <a:latin typeface="Helvetica Neue"/>
+                <a:hlinkClick r:id="rId4"/>
+              </a:rPr>
+              <a:t>Erick Ruiz de </a:t>
+            </a:r>
+            <a:r>
+              <a:rPr lang="en-US" sz="1000" dirty="0" smtClean="0">
+                <a:solidFill>
+                  <a:srgbClr val="4374B7"/>
+                </a:solidFill>
+                <a:latin typeface="Helvetica Neue"/>
+                <a:hlinkClick r:id="rId4"/>
+              </a:rPr>
+              <a:t>Chavez</a:t>
+            </a:r>
+            <a:r>
+              <a:rPr lang="en-US" sz="1000" dirty="0">
+                <a:solidFill>
+                  <a:srgbClr val="000000"/>
+                </a:solidFill>
+                <a:latin typeface="Helvetica Neue"/>
+              </a:rPr>
+              <a:t> is licensed under a </a:t>
+            </a:r>
+            <a:r>
+              <a:rPr lang="en-US" sz="1000" dirty="0">
+                <a:solidFill>
+                  <a:srgbClr val="4374B7"/>
+                </a:solidFill>
+                <a:latin typeface="Helvetica Neue"/>
+                <a:hlinkClick r:id="rId6"/>
+              </a:rPr>
+              <a:t>Creative Commons Attribution 3.0 </a:t>
+            </a:r>
+            <a:r>
+              <a:rPr lang="en-US" sz="1000" dirty="0" err="1">
+                <a:solidFill>
+                  <a:srgbClr val="4374B7"/>
+                </a:solidFill>
+                <a:latin typeface="Helvetica Neue"/>
+                <a:hlinkClick r:id="rId6"/>
+              </a:rPr>
+              <a:t>Unported</a:t>
+            </a:r>
+            <a:r>
+              <a:rPr lang="en-US" sz="1000" dirty="0">
+                <a:solidFill>
+                  <a:srgbClr val="4374B7"/>
+                </a:solidFill>
+                <a:latin typeface="Helvetica Neue"/>
+                <a:hlinkClick r:id="rId6"/>
+              </a:rPr>
+              <a:t> License</a:t>
+            </a:r>
+            <a:r>
+              <a:rPr lang="en-US" sz="1000" dirty="0">
+                <a:solidFill>
+                  <a:srgbClr val="000000"/>
+                </a:solidFill>
+                <a:latin typeface="Helvetica Neue"/>
+              </a:rPr>
+              <a:t>.</a:t>
+            </a:r>
+            <a:endParaRPr lang="en-US" sz="1000" dirty="0"/>
+          </a:p>
+        </p:txBody>
+      </p:sp>
     </p:spTree>
     <p:extLst>
       <p:ext uri="{BB962C8B-B14F-4D97-AF65-F5344CB8AC3E}">
@@ -7448,6 +7785,21 @@
 <file path=ppt/slides/slide2.xml><?xml version="1.0" encoding="utf-8"?>
 <p:sld xmlns:a="http://schemas.openxmlformats.org/drawingml/2006/main" xmlns:r="http://schemas.openxmlformats.org/officeDocument/2006/relationships" xmlns:p="http://schemas.openxmlformats.org/presentationml/2006/main">
   <p:cSld>
+    <p:bg>
+      <p:bgPr>
+        <a:blipFill dpi="0" rotWithShape="1">
+          <a:blip r:embed="rId3">
+            <a:alphaModFix amt="25000"/>
+            <a:lum/>
+          </a:blip>
+          <a:srcRect/>
+          <a:stretch>
+            <a:fillRect l="75000" t="75000" r="5000"/>
+          </a:stretch>
+        </a:blipFill>
+        <a:effectLst/>
+      </p:bgPr>
+    </p:bg>
     <p:spTree>
       <p:nvGrpSpPr>
         <p:cNvPr id="1" name=""/>
@@ -7548,19 +7900,7 @@
                 <a:latin typeface="Consolas" pitchFamily="49" charset="0"/>
                 <a:cs typeface="Consolas" pitchFamily="49" charset="0"/>
               </a:rPr>
-              <a:t> </a:t>
-            </a:r>
-            <a:r>
-              <a:rPr lang="en-US" sz="2400" dirty="0" smtClean="0">
-                <a:solidFill>
-                  <a:schemeClr val="bg1">
-                    <a:lumMod val="65000"/>
-                  </a:schemeClr>
-                </a:solidFill>
-                <a:latin typeface="Consolas" pitchFamily="49" charset="0"/>
-                <a:cs typeface="Consolas" pitchFamily="49" charset="0"/>
-              </a:rPr>
-              <a:t>soy </a:t>
+              <a:t> soy </a:t>
             </a:r>
             <a:r>
               <a:rPr lang="en-US" sz="2400" dirty="0" err="1" smtClean="0">
@@ -7781,7 +8121,7 @@
           <a:p>
             <a:r>
               <a:rPr lang="en-US" dirty="0" smtClean="0">
-                <a:hlinkClick r:id="rId2"/>
+                <a:hlinkClick r:id="rId4"/>
               </a:rPr>
               <a:t>erickrdch.com</a:t>
             </a:r>
@@ -7789,7 +8129,6 @@
               <a:rPr lang="en-US" dirty="0" smtClean="0"/>
               <a:t> </a:t>
             </a:r>
-            <a:endParaRPr lang="en-US" dirty="0" smtClean="0"/>
           </a:p>
           <a:p>
             <a:r>
@@ -7820,7 +8159,7 @@
           <p:nvPr/>
         </p:nvPicPr>
         <p:blipFill>
-          <a:blip r:embed="rId3" cstate="print">
+          <a:blip r:embed="rId5" cstate="print">
             <a:extLst>
               <a:ext uri="{28A0092B-C50C-407E-A947-70E740481C1C}">
                 <a14:useLocalDpi xmlns:a14="http://schemas.microsoft.com/office/drawing/2010/main" val="0"/>
@@ -7882,6 +8221,21 @@
 <file path=ppt/slides/slide3.xml><?xml version="1.0" encoding="utf-8"?>
 <p:sld xmlns:a="http://schemas.openxmlformats.org/drawingml/2006/main" xmlns:r="http://schemas.openxmlformats.org/officeDocument/2006/relationships" xmlns:p="http://schemas.openxmlformats.org/presentationml/2006/main">
   <p:cSld>
+    <p:bg>
+      <p:bgPr>
+        <a:blipFill dpi="0" rotWithShape="1">
+          <a:blip r:embed="rId2">
+            <a:alphaModFix amt="25000"/>
+            <a:lum/>
+          </a:blip>
+          <a:srcRect/>
+          <a:stretch>
+            <a:fillRect l="75000" t="75000" r="5000"/>
+          </a:stretch>
+        </a:blipFill>
+        <a:effectLst/>
+      </p:bgPr>
+    </p:bg>
     <p:spTree>
       <p:nvGrpSpPr>
         <p:cNvPr id="1" name=""/>
@@ -8507,6 +8861,21 @@
 <file path=ppt/slides/slide4.xml><?xml version="1.0" encoding="utf-8"?>
 <p:sld xmlns:a="http://schemas.openxmlformats.org/drawingml/2006/main" xmlns:r="http://schemas.openxmlformats.org/officeDocument/2006/relationships" xmlns:p="http://schemas.openxmlformats.org/presentationml/2006/main">
   <p:cSld>
+    <p:bg>
+      <p:bgPr>
+        <a:blipFill dpi="0" rotWithShape="1">
+          <a:blip r:embed="rId2">
+            <a:alphaModFix amt="25000"/>
+            <a:lum/>
+          </a:blip>
+          <a:srcRect/>
+          <a:stretch>
+            <a:fillRect l="75000" t="75000" r="5000"/>
+          </a:stretch>
+        </a:blipFill>
+        <a:effectLst/>
+      </p:bgPr>
+    </p:bg>
     <p:spTree>
       <p:nvGrpSpPr>
         <p:cNvPr id="1" name=""/>
@@ -8885,6 +9254,21 @@
 <file path=ppt/slides/slide5.xml><?xml version="1.0" encoding="utf-8"?>
 <p:sld xmlns:a="http://schemas.openxmlformats.org/drawingml/2006/main" xmlns:r="http://schemas.openxmlformats.org/officeDocument/2006/relationships" xmlns:p="http://schemas.openxmlformats.org/presentationml/2006/main">
   <p:cSld>
+    <p:bg>
+      <p:bgPr>
+        <a:blipFill dpi="0" rotWithShape="1">
+          <a:blip r:embed="rId2">
+            <a:alphaModFix amt="25000"/>
+            <a:lum/>
+          </a:blip>
+          <a:srcRect/>
+          <a:stretch>
+            <a:fillRect l="75000" t="75000" r="5000"/>
+          </a:stretch>
+        </a:blipFill>
+        <a:effectLst/>
+      </p:bgPr>
+    </p:bg>
     <p:spTree>
       <p:nvGrpSpPr>
         <p:cNvPr id="1" name=""/>
@@ -9137,6 +9521,21 @@
 <file path=ppt/slides/slide6.xml><?xml version="1.0" encoding="utf-8"?>
 <p:sld xmlns:a="http://schemas.openxmlformats.org/drawingml/2006/main" xmlns:r="http://schemas.openxmlformats.org/officeDocument/2006/relationships" xmlns:p="http://schemas.openxmlformats.org/presentationml/2006/main">
   <p:cSld>
+    <p:bg>
+      <p:bgPr>
+        <a:blipFill dpi="0" rotWithShape="1">
+          <a:blip r:embed="rId2">
+            <a:alphaModFix amt="25000"/>
+            <a:lum/>
+          </a:blip>
+          <a:srcRect/>
+          <a:stretch>
+            <a:fillRect l="75000" t="75000" r="5000"/>
+          </a:stretch>
+        </a:blipFill>
+        <a:effectLst/>
+      </p:bgPr>
+    </p:bg>
     <p:spTree>
       <p:nvGrpSpPr>
         <p:cNvPr id="1" name=""/>
@@ -9513,6 +9912,21 @@
 <file path=ppt/slides/slide7.xml><?xml version="1.0" encoding="utf-8"?>
 <p:sld xmlns:a="http://schemas.openxmlformats.org/drawingml/2006/main" xmlns:r="http://schemas.openxmlformats.org/officeDocument/2006/relationships" xmlns:p="http://schemas.openxmlformats.org/presentationml/2006/main">
   <p:cSld>
+    <p:bg>
+      <p:bgPr>
+        <a:blipFill dpi="0" rotWithShape="1">
+          <a:blip r:embed="rId2">
+            <a:alphaModFix amt="25000"/>
+            <a:lum/>
+          </a:blip>
+          <a:srcRect/>
+          <a:stretch>
+            <a:fillRect l="75000" t="75000" r="5000"/>
+          </a:stretch>
+        </a:blipFill>
+        <a:effectLst/>
+      </p:bgPr>
+    </p:bg>
     <p:spTree>
       <p:nvGrpSpPr>
         <p:cNvPr id="1" name=""/>
@@ -9627,19 +10041,7 @@
                 <a:latin typeface="Consolas" pitchFamily="49" charset="0"/>
                 <a:cs typeface="Consolas" pitchFamily="49" charset="0"/>
               </a:rPr>
-              <a:t> </a:t>
-            </a:r>
-            <a:r>
-              <a:rPr lang="en-US" sz="2400" dirty="0" smtClean="0">
-                <a:solidFill>
-                  <a:schemeClr val="bg1">
-                    <a:lumMod val="65000"/>
-                  </a:schemeClr>
-                </a:solidFill>
-                <a:latin typeface="Consolas" pitchFamily="49" charset="0"/>
-                <a:cs typeface="Consolas" pitchFamily="49" charset="0"/>
-              </a:rPr>
-              <a:t>o no </a:t>
+              <a:t> o no </a:t>
             </a:r>
             <a:r>
               <a:rPr lang="en-US" sz="2400" dirty="0" err="1" smtClean="0">
@@ -9994,6 +10396,21 @@
 <file path=ppt/slides/slide8.xml><?xml version="1.0" encoding="utf-8"?>
 <p:sld xmlns:a="http://schemas.openxmlformats.org/drawingml/2006/main" xmlns:r="http://schemas.openxmlformats.org/officeDocument/2006/relationships" xmlns:p="http://schemas.openxmlformats.org/presentationml/2006/main">
   <p:cSld>
+    <p:bg>
+      <p:bgPr>
+        <a:blipFill dpi="0" rotWithShape="1">
+          <a:blip r:embed="rId2">
+            <a:alphaModFix amt="25000"/>
+            <a:lum/>
+          </a:blip>
+          <a:srcRect/>
+          <a:stretch>
+            <a:fillRect l="75000" t="75000" r="5000"/>
+          </a:stretch>
+        </a:blipFill>
+        <a:effectLst/>
+      </p:bgPr>
+    </p:bg>
     <p:spTree>
       <p:nvGrpSpPr>
         <p:cNvPr id="1" name=""/>
@@ -10098,19 +10515,7 @@
                 <a:latin typeface="Consolas" pitchFamily="49" charset="0"/>
                 <a:cs typeface="Consolas" pitchFamily="49" charset="0"/>
               </a:rPr>
-              <a:t> </a:t>
-            </a:r>
-            <a:r>
-              <a:rPr lang="en-US" sz="2400" dirty="0" smtClean="0">
-                <a:solidFill>
-                  <a:schemeClr val="bg1">
-                    <a:lumMod val="65000"/>
-                  </a:schemeClr>
-                </a:solidFill>
-                <a:latin typeface="Consolas" pitchFamily="49" charset="0"/>
-                <a:cs typeface="Consolas" pitchFamily="49" charset="0"/>
-              </a:rPr>
-              <a:t>me </a:t>
+              <a:t> me </a:t>
             </a:r>
             <a:r>
               <a:rPr lang="en-US" sz="2400" dirty="0" err="1" smtClean="0">
@@ -10340,8 +10745,8 @@
               <a:t>history, </a:t>
             </a:r>
             <a:r>
-              <a:rPr lang="en-US" dirty="0" err="1" smtClean="0"/>
-              <a:t>sinc</a:t>
+              <a:rPr lang="en-US" dirty="0" smtClean="0"/>
+              <a:t>sync</a:t>
             </a:r>
             <a:endParaRPr lang="en-US" dirty="0" smtClean="0"/>
           </a:p>
@@ -10370,6 +10775,21 @@
 <file path=ppt/slides/slide9.xml><?xml version="1.0" encoding="utf-8"?>
 <p:sld xmlns:a="http://schemas.openxmlformats.org/drawingml/2006/main" xmlns:r="http://schemas.openxmlformats.org/officeDocument/2006/relationships" xmlns:p="http://schemas.openxmlformats.org/presentationml/2006/main">
   <p:cSld>
+    <p:bg>
+      <p:bgPr>
+        <a:blipFill dpi="0" rotWithShape="1">
+          <a:blip r:embed="rId2">
+            <a:alphaModFix amt="25000"/>
+            <a:lum/>
+          </a:blip>
+          <a:srcRect/>
+          <a:stretch>
+            <a:fillRect l="75000" t="75000" r="5000"/>
+          </a:stretch>
+        </a:blipFill>
+        <a:effectLst/>
+      </p:bgPr>
+    </p:bg>
     <p:spTree>
       <p:nvGrpSpPr>
         <p:cNvPr id="1" name=""/>
@@ -10474,19 +10894,7 @@
                 <a:latin typeface="Consolas" pitchFamily="49" charset="0"/>
                 <a:cs typeface="Consolas" pitchFamily="49" charset="0"/>
               </a:rPr>
-              <a:t> </a:t>
-            </a:r>
-            <a:r>
-              <a:rPr lang="en-US" sz="2400" dirty="0" smtClean="0">
-                <a:solidFill>
-                  <a:schemeClr val="bg1">
-                    <a:lumMod val="65000"/>
-                  </a:schemeClr>
-                </a:solidFill>
-                <a:latin typeface="Consolas" pitchFamily="49" charset="0"/>
-                <a:cs typeface="Consolas" pitchFamily="49" charset="0"/>
-              </a:rPr>
-              <a:t>me </a:t>
+              <a:t> me </a:t>
             </a:r>
             <a:r>
               <a:rPr lang="en-US" sz="2400" dirty="0" err="1" smtClean="0">
@@ -10698,11 +11106,7 @@
             </a:pPr>
             <a:r>
               <a:rPr lang="en-US" i="1" dirty="0" smtClean="0"/>
-              <a:t>	You’ve got mail</a:t>
-            </a:r>
-            <a:r>
-              <a:rPr lang="en-US" i="1" dirty="0" smtClean="0"/>
-              <a:t>! </a:t>
+              <a:t>	You’ve got mail! </a:t>
             </a:r>
             <a:r>
               <a:rPr lang="en-US" sz="2400" i="1" dirty="0" smtClean="0"/>
@@ -10710,19 +11114,19 @@
             </a:r>
             <a:r>
               <a:rPr lang="en-US" sz="2400" i="1" dirty="0" smtClean="0">
-                <a:hlinkClick r:id="rId2"/>
+                <a:hlinkClick r:id="rId3"/>
               </a:rPr>
               <a:t>http</a:t>
             </a:r>
             <a:r>
               <a:rPr lang="en-US" sz="2400" i="1" dirty="0">
-                <a:hlinkClick r:id="rId2"/>
+                <a:hlinkClick r:id="rId3"/>
               </a:rPr>
               <a:t>://</a:t>
             </a:r>
             <a:r>
               <a:rPr lang="en-US" sz="2400" i="1" dirty="0" smtClean="0">
-                <a:hlinkClick r:id="rId2"/>
+                <a:hlinkClick r:id="rId3"/>
               </a:rPr>
               <a:t>youtu.be/gFBLiHpkcOk</a:t>
             </a:r>
@@ -10730,7 +11134,6 @@
               <a:rPr lang="en-US" sz="2400" i="1" dirty="0" smtClean="0"/>
               <a:t> </a:t>
             </a:r>
-            <a:endParaRPr lang="en-US" sz="2400" i="1" dirty="0" smtClean="0"/>
           </a:p>
           <a:p>
             <a:endParaRPr lang="en-US" dirty="0"/>

</xml_diff>